<commit_message>
BSPD and loom documentation
</commit_message>
<xml_diff>
--- a/EV3 Loom/EV3_Loom_Topology_V1.pptx
+++ b/EV3 Loom/EV3_Loom_Topology_V1.pptx
@@ -243,7 +243,7 @@
           <a:p>
             <a:fld id="{2463DE9C-7031-405B-B7A9-11D1A3C48657}" type="datetimeFigureOut">
               <a:rPr lang="en-AU" smtClean="0"/>
-              <a:t>2/02/2021</a:t>
+              <a:t>4/02/2021</a:t>
             </a:fld>
             <a:endParaRPr lang="en-AU"/>
           </a:p>
@@ -413,7 +413,7 @@
           <a:p>
             <a:fld id="{2463DE9C-7031-405B-B7A9-11D1A3C48657}" type="datetimeFigureOut">
               <a:rPr lang="en-AU" smtClean="0"/>
-              <a:t>2/02/2021</a:t>
+              <a:t>4/02/2021</a:t>
             </a:fld>
             <a:endParaRPr lang="en-AU"/>
           </a:p>
@@ -593,7 +593,7 @@
           <a:p>
             <a:fld id="{2463DE9C-7031-405B-B7A9-11D1A3C48657}" type="datetimeFigureOut">
               <a:rPr lang="en-AU" smtClean="0"/>
-              <a:t>2/02/2021</a:t>
+              <a:t>4/02/2021</a:t>
             </a:fld>
             <a:endParaRPr lang="en-AU"/>
           </a:p>
@@ -763,7 +763,7 @@
           <a:p>
             <a:fld id="{2463DE9C-7031-405B-B7A9-11D1A3C48657}" type="datetimeFigureOut">
               <a:rPr lang="en-AU" smtClean="0"/>
-              <a:t>2/02/2021</a:t>
+              <a:t>4/02/2021</a:t>
             </a:fld>
             <a:endParaRPr lang="en-AU"/>
           </a:p>
@@ -1007,7 +1007,7 @@
           <a:p>
             <a:fld id="{2463DE9C-7031-405B-B7A9-11D1A3C48657}" type="datetimeFigureOut">
               <a:rPr lang="en-AU" smtClean="0"/>
-              <a:t>2/02/2021</a:t>
+              <a:t>4/02/2021</a:t>
             </a:fld>
             <a:endParaRPr lang="en-AU"/>
           </a:p>
@@ -1239,7 +1239,7 @@
           <a:p>
             <a:fld id="{2463DE9C-7031-405B-B7A9-11D1A3C48657}" type="datetimeFigureOut">
               <a:rPr lang="en-AU" smtClean="0"/>
-              <a:t>2/02/2021</a:t>
+              <a:t>4/02/2021</a:t>
             </a:fld>
             <a:endParaRPr lang="en-AU"/>
           </a:p>
@@ -1606,7 +1606,7 @@
           <a:p>
             <a:fld id="{2463DE9C-7031-405B-B7A9-11D1A3C48657}" type="datetimeFigureOut">
               <a:rPr lang="en-AU" smtClean="0"/>
-              <a:t>2/02/2021</a:t>
+              <a:t>4/02/2021</a:t>
             </a:fld>
             <a:endParaRPr lang="en-AU"/>
           </a:p>
@@ -1724,7 +1724,7 @@
           <a:p>
             <a:fld id="{2463DE9C-7031-405B-B7A9-11D1A3C48657}" type="datetimeFigureOut">
               <a:rPr lang="en-AU" smtClean="0"/>
-              <a:t>2/02/2021</a:t>
+              <a:t>4/02/2021</a:t>
             </a:fld>
             <a:endParaRPr lang="en-AU"/>
           </a:p>
@@ -1819,7 +1819,7 @@
           <a:p>
             <a:fld id="{2463DE9C-7031-405B-B7A9-11D1A3C48657}" type="datetimeFigureOut">
               <a:rPr lang="en-AU" smtClean="0"/>
-              <a:t>2/02/2021</a:t>
+              <a:t>4/02/2021</a:t>
             </a:fld>
             <a:endParaRPr lang="en-AU"/>
           </a:p>
@@ -2096,7 +2096,7 @@
           <a:p>
             <a:fld id="{2463DE9C-7031-405B-B7A9-11D1A3C48657}" type="datetimeFigureOut">
               <a:rPr lang="en-AU" smtClean="0"/>
-              <a:t>2/02/2021</a:t>
+              <a:t>4/02/2021</a:t>
             </a:fld>
             <a:endParaRPr lang="en-AU"/>
           </a:p>
@@ -2353,7 +2353,7 @@
           <a:p>
             <a:fld id="{2463DE9C-7031-405B-B7A9-11D1A3C48657}" type="datetimeFigureOut">
               <a:rPr lang="en-AU" smtClean="0"/>
-              <a:t>2/02/2021</a:t>
+              <a:t>4/02/2021</a:t>
             </a:fld>
             <a:endParaRPr lang="en-AU"/>
           </a:p>
@@ -2566,7 +2566,7 @@
           <a:p>
             <a:fld id="{2463DE9C-7031-405B-B7A9-11D1A3C48657}" type="datetimeFigureOut">
               <a:rPr lang="en-AU" smtClean="0"/>
-              <a:t>2/02/2021</a:t>
+              <a:t>4/02/2021</a:t>
             </a:fld>
             <a:endParaRPr lang="en-AU"/>
           </a:p>

</xml_diff>